<commit_message>
Updated figure and caption
</commit_message>
<xml_diff>
--- a/paper/osiris_workflow.pptx
+++ b/paper/osiris_workflow.pptx
@@ -243,7 +243,7 @@
           <a:p>
             <a:fld id="{062C32FD-3345-49D3-8557-5864A615BC2F}" type="datetimeFigureOut">
               <a:rPr lang="en-US" smtClean="0"/>
-              <a:t>2/22/2023</a:t>
+              <a:t>2/23/2023</a:t>
             </a:fld>
             <a:endParaRPr lang="en-US"/>
           </a:p>
@@ -413,7 +413,7 @@
           <a:p>
             <a:fld id="{062C32FD-3345-49D3-8557-5864A615BC2F}" type="datetimeFigureOut">
               <a:rPr lang="en-US" smtClean="0"/>
-              <a:t>2/22/2023</a:t>
+              <a:t>2/23/2023</a:t>
             </a:fld>
             <a:endParaRPr lang="en-US"/>
           </a:p>
@@ -593,7 +593,7 @@
           <a:p>
             <a:fld id="{062C32FD-3345-49D3-8557-5864A615BC2F}" type="datetimeFigureOut">
               <a:rPr lang="en-US" smtClean="0"/>
-              <a:t>2/22/2023</a:t>
+              <a:t>2/23/2023</a:t>
             </a:fld>
             <a:endParaRPr lang="en-US"/>
           </a:p>
@@ -763,7 +763,7 @@
           <a:p>
             <a:fld id="{062C32FD-3345-49D3-8557-5864A615BC2F}" type="datetimeFigureOut">
               <a:rPr lang="en-US" smtClean="0"/>
-              <a:t>2/22/2023</a:t>
+              <a:t>2/23/2023</a:t>
             </a:fld>
             <a:endParaRPr lang="en-US"/>
           </a:p>
@@ -1009,7 +1009,7 @@
           <a:p>
             <a:fld id="{062C32FD-3345-49D3-8557-5864A615BC2F}" type="datetimeFigureOut">
               <a:rPr lang="en-US" smtClean="0"/>
-              <a:t>2/22/2023</a:t>
+              <a:t>2/23/2023</a:t>
             </a:fld>
             <a:endParaRPr lang="en-US"/>
           </a:p>
@@ -1241,7 +1241,7 @@
           <a:p>
             <a:fld id="{062C32FD-3345-49D3-8557-5864A615BC2F}" type="datetimeFigureOut">
               <a:rPr lang="en-US" smtClean="0"/>
-              <a:t>2/22/2023</a:t>
+              <a:t>2/23/2023</a:t>
             </a:fld>
             <a:endParaRPr lang="en-US"/>
           </a:p>
@@ -1608,7 +1608,7 @@
           <a:p>
             <a:fld id="{062C32FD-3345-49D3-8557-5864A615BC2F}" type="datetimeFigureOut">
               <a:rPr lang="en-US" smtClean="0"/>
-              <a:t>2/22/2023</a:t>
+              <a:t>2/23/2023</a:t>
             </a:fld>
             <a:endParaRPr lang="en-US"/>
           </a:p>
@@ -1726,7 +1726,7 @@
           <a:p>
             <a:fld id="{062C32FD-3345-49D3-8557-5864A615BC2F}" type="datetimeFigureOut">
               <a:rPr lang="en-US" smtClean="0"/>
-              <a:t>2/22/2023</a:t>
+              <a:t>2/23/2023</a:t>
             </a:fld>
             <a:endParaRPr lang="en-US"/>
           </a:p>
@@ -1821,7 +1821,7 @@
           <a:p>
             <a:fld id="{062C32FD-3345-49D3-8557-5864A615BC2F}" type="datetimeFigureOut">
               <a:rPr lang="en-US" smtClean="0"/>
-              <a:t>2/22/2023</a:t>
+              <a:t>2/23/2023</a:t>
             </a:fld>
             <a:endParaRPr lang="en-US"/>
           </a:p>
@@ -2098,7 +2098,7 @@
           <a:p>
             <a:fld id="{062C32FD-3345-49D3-8557-5864A615BC2F}" type="datetimeFigureOut">
               <a:rPr lang="en-US" smtClean="0"/>
-              <a:t>2/22/2023</a:t>
+              <a:t>2/23/2023</a:t>
             </a:fld>
             <a:endParaRPr lang="en-US"/>
           </a:p>
@@ -2355,7 +2355,7 @@
           <a:p>
             <a:fld id="{062C32FD-3345-49D3-8557-5864A615BC2F}" type="datetimeFigureOut">
               <a:rPr lang="en-US" smtClean="0"/>
-              <a:t>2/22/2023</a:t>
+              <a:t>2/23/2023</a:t>
             </a:fld>
             <a:endParaRPr lang="en-US"/>
           </a:p>
@@ -2568,7 +2568,7 @@
           <a:p>
             <a:fld id="{062C32FD-3345-49D3-8557-5864A615BC2F}" type="datetimeFigureOut">
               <a:rPr lang="en-US" smtClean="0"/>
-              <a:t>2/22/2023</a:t>
+              <a:t>2/23/2023</a:t>
             </a:fld>
             <a:endParaRPr lang="en-US"/>
           </a:p>
@@ -2987,8 +2987,8 @@
         </p:nvSpPr>
         <p:spPr>
           <a:xfrm>
-            <a:off x="124185" y="997863"/>
-            <a:ext cx="4756184" cy="2111540"/>
+            <a:off x="115422" y="964675"/>
+            <a:ext cx="4773710" cy="2006996"/>
           </a:xfrm>
           <a:prstGeom prst="roundRect">
             <a:avLst/>
@@ -3022,7 +3022,7 @@
           <a:p>
             <a:pPr algn="ctr"/>
             <a:r>
-              <a:rPr lang="en-US" sz="2400" b="1" dirty="0"/>
+              <a:rPr lang="en-US" sz="2800" b="1" dirty="0"/>
               <a:t>Monthly Temperature and Precipitation at 0.5-deg</a:t>
             </a:r>
           </a:p>
@@ -3062,7 +3062,7 @@
         </p:nvSpPr>
         <p:spPr>
           <a:xfrm>
-            <a:off x="5634370" y="1378981"/>
+            <a:off x="5634370" y="1293521"/>
             <a:ext cx="3583450" cy="1349304"/>
           </a:xfrm>
           <a:prstGeom prst="roundRect">
@@ -3097,10 +3097,10 @@
           <a:p>
             <a:pPr algn="ctr"/>
             <a:r>
-              <a:rPr lang="en-US" sz="2400" b="1" dirty="0"/>
+              <a:rPr lang="en-US" sz="2800" b="1" dirty="0"/>
               <a:t>Agricultural Productivity Change</a:t>
             </a:r>
-            <a:endParaRPr lang="en-US" dirty="0"/>
+            <a:endParaRPr lang="en-US" sz="2000" dirty="0"/>
           </a:p>
         </p:txBody>
       </p:sp>
@@ -3118,7 +3118,7 @@
         </p:nvSpPr>
         <p:spPr>
           <a:xfrm>
-            <a:off x="9941795" y="1378981"/>
+            <a:off x="9941795" y="1293521"/>
             <a:ext cx="3210346" cy="1349304"/>
           </a:xfrm>
           <a:prstGeom prst="roundRect">
@@ -3153,9 +3153,10 @@
           <a:p>
             <a:pPr algn="ctr"/>
             <a:r>
-              <a:rPr lang="en-US" sz="2400" b="1" dirty="0"/>
+              <a:rPr lang="en-US" sz="2800" b="1" dirty="0"/>
               <a:t>GCAM</a:t>
             </a:r>
+            <a:endParaRPr lang="en-US" sz="2400" b="1" dirty="0"/>
           </a:p>
           <a:p>
             <a:pPr algn="ctr"/>
@@ -3184,8 +3185,8 @@
         </p:nvCxnSpPr>
         <p:spPr>
           <a:xfrm>
-            <a:off x="4880374" y="2053633"/>
-            <a:ext cx="753997" cy="0"/>
+            <a:off x="4889132" y="1968173"/>
+            <a:ext cx="745238" cy="0"/>
           </a:xfrm>
           <a:prstGeom prst="straightConnector1">
             <a:avLst/>
@@ -3230,7 +3231,7 @@
         </p:nvCxnSpPr>
         <p:spPr>
           <a:xfrm flipV="1">
-            <a:off x="9217819" y="2053633"/>
+            <a:off x="9217819" y="1968173"/>
             <a:ext cx="723976" cy="0"/>
           </a:xfrm>
           <a:prstGeom prst="bentConnector3">
@@ -3274,7 +3275,7 @@
         </p:nvSpPr>
         <p:spPr>
           <a:xfrm>
-            <a:off x="1408538" y="59968"/>
+            <a:off x="1408538" y="188157"/>
             <a:ext cx="2187478" cy="532983"/>
           </a:xfrm>
           <a:prstGeom prst="flowChartProcess">
@@ -3330,7 +3331,7 @@
         </p:nvSpPr>
         <p:spPr>
           <a:xfrm>
-            <a:off x="6332354" y="59968"/>
+            <a:off x="6332354" y="188157"/>
             <a:ext cx="2187478" cy="532983"/>
           </a:xfrm>
           <a:prstGeom prst="flowChartProcess">
@@ -3362,13 +3363,18 @@
           <a:p>
             <a:pPr algn="ctr"/>
             <a:r>
-              <a:rPr lang="en-US" sz="3199" b="1" dirty="0">
+              <a:rPr lang="en-US" sz="3199" b="1" dirty="0" err="1">
                 <a:solidFill>
                   <a:schemeClr val="tx1"/>
                 </a:solidFill>
               </a:rPr>
-              <a:t>Osiris</a:t>
-            </a:r>
+              <a:t>osiris</a:t>
+            </a:r>
+            <a:endParaRPr lang="en-US" sz="3199" b="1" dirty="0">
+              <a:solidFill>
+                <a:schemeClr val="tx1"/>
+              </a:solidFill>
+            </a:endParaRPr>
           </a:p>
         </p:txBody>
       </p:sp>

</xml_diff>

<commit_message>
Fixed typo in paper and edited figure 1
</commit_message>
<xml_diff>
--- a/paper/osiris_workflow.pptx
+++ b/paper/osiris_workflow.pptx
@@ -243,7 +243,7 @@
           <a:p>
             <a:fld id="{062C32FD-3345-49D3-8557-5864A615BC2F}" type="datetimeFigureOut">
               <a:rPr lang="en-US" smtClean="0"/>
-              <a:t>2/23/2023</a:t>
+              <a:t>5/12/2023</a:t>
             </a:fld>
             <a:endParaRPr lang="en-US"/>
           </a:p>
@@ -413,7 +413,7 @@
           <a:p>
             <a:fld id="{062C32FD-3345-49D3-8557-5864A615BC2F}" type="datetimeFigureOut">
               <a:rPr lang="en-US" smtClean="0"/>
-              <a:t>2/23/2023</a:t>
+              <a:t>5/12/2023</a:t>
             </a:fld>
             <a:endParaRPr lang="en-US"/>
           </a:p>
@@ -593,7 +593,7 @@
           <a:p>
             <a:fld id="{062C32FD-3345-49D3-8557-5864A615BC2F}" type="datetimeFigureOut">
               <a:rPr lang="en-US" smtClean="0"/>
-              <a:t>2/23/2023</a:t>
+              <a:t>5/12/2023</a:t>
             </a:fld>
             <a:endParaRPr lang="en-US"/>
           </a:p>
@@ -763,7 +763,7 @@
           <a:p>
             <a:fld id="{062C32FD-3345-49D3-8557-5864A615BC2F}" type="datetimeFigureOut">
               <a:rPr lang="en-US" smtClean="0"/>
-              <a:t>2/23/2023</a:t>
+              <a:t>5/12/2023</a:t>
             </a:fld>
             <a:endParaRPr lang="en-US"/>
           </a:p>
@@ -1009,7 +1009,7 @@
           <a:p>
             <a:fld id="{062C32FD-3345-49D3-8557-5864A615BC2F}" type="datetimeFigureOut">
               <a:rPr lang="en-US" smtClean="0"/>
-              <a:t>2/23/2023</a:t>
+              <a:t>5/12/2023</a:t>
             </a:fld>
             <a:endParaRPr lang="en-US"/>
           </a:p>
@@ -1241,7 +1241,7 @@
           <a:p>
             <a:fld id="{062C32FD-3345-49D3-8557-5864A615BC2F}" type="datetimeFigureOut">
               <a:rPr lang="en-US" smtClean="0"/>
-              <a:t>2/23/2023</a:t>
+              <a:t>5/12/2023</a:t>
             </a:fld>
             <a:endParaRPr lang="en-US"/>
           </a:p>
@@ -1608,7 +1608,7 @@
           <a:p>
             <a:fld id="{062C32FD-3345-49D3-8557-5864A615BC2F}" type="datetimeFigureOut">
               <a:rPr lang="en-US" smtClean="0"/>
-              <a:t>2/23/2023</a:t>
+              <a:t>5/12/2023</a:t>
             </a:fld>
             <a:endParaRPr lang="en-US"/>
           </a:p>
@@ -1726,7 +1726,7 @@
           <a:p>
             <a:fld id="{062C32FD-3345-49D3-8557-5864A615BC2F}" type="datetimeFigureOut">
               <a:rPr lang="en-US" smtClean="0"/>
-              <a:t>2/23/2023</a:t>
+              <a:t>5/12/2023</a:t>
             </a:fld>
             <a:endParaRPr lang="en-US"/>
           </a:p>
@@ -1821,7 +1821,7 @@
           <a:p>
             <a:fld id="{062C32FD-3345-49D3-8557-5864A615BC2F}" type="datetimeFigureOut">
               <a:rPr lang="en-US" smtClean="0"/>
-              <a:t>2/23/2023</a:t>
+              <a:t>5/12/2023</a:t>
             </a:fld>
             <a:endParaRPr lang="en-US"/>
           </a:p>
@@ -2098,7 +2098,7 @@
           <a:p>
             <a:fld id="{062C32FD-3345-49D3-8557-5864A615BC2F}" type="datetimeFigureOut">
               <a:rPr lang="en-US" smtClean="0"/>
-              <a:t>2/23/2023</a:t>
+              <a:t>5/12/2023</a:t>
             </a:fld>
             <a:endParaRPr lang="en-US"/>
           </a:p>
@@ -2355,7 +2355,7 @@
           <a:p>
             <a:fld id="{062C32FD-3345-49D3-8557-5864A615BC2F}" type="datetimeFigureOut">
               <a:rPr lang="en-US" smtClean="0"/>
-              <a:t>2/23/2023</a:t>
+              <a:t>5/12/2023</a:t>
             </a:fld>
             <a:endParaRPr lang="en-US"/>
           </a:p>
@@ -2568,7 +2568,7 @@
           <a:p>
             <a:fld id="{062C32FD-3345-49D3-8557-5864A615BC2F}" type="datetimeFigureOut">
               <a:rPr lang="en-US" smtClean="0"/>
-              <a:t>2/23/2023</a:t>
+              <a:t>5/12/2023</a:t>
             </a:fld>
             <a:endParaRPr lang="en-US"/>
           </a:p>
@@ -3023,7 +3023,7 @@
             <a:pPr algn="ctr"/>
             <a:r>
               <a:rPr lang="en-US" sz="2800" b="1" dirty="0"/>
-              <a:t>Monthly Temperature and Precipitation at 0.5-deg</a:t>
+              <a:t>Gridded Temperature and Precipitation</a:t>
             </a:r>
           </a:p>
           <a:p>

</xml_diff>